<commit_message>
edited loops, added solutions
</commit_message>
<xml_diff>
--- a/docs/images.pptx
+++ b/docs/images.pptx
@@ -7,6 +7,7 @@
   <p:sldIdLst>
     <p:sldId id="257" r:id="rId2"/>
     <p:sldId id="258" r:id="rId3"/>
+    <p:sldId id="259" r:id="rId4"/>
   </p:sldIdLst>
   <p:sldSz cx="12192000" cy="6858000"/>
   <p:notesSz cx="6858000" cy="9144000"/>
@@ -5555,6 +5556,1126 @@
 </p:sld>
 </file>
 
+<file path=ppt/slides/slide3.xml><?xml version="1.0" encoding="utf-8"?>
+<p:sld xmlns:a="http://schemas.openxmlformats.org/drawingml/2006/main" xmlns:r="http://schemas.openxmlformats.org/officeDocument/2006/relationships" xmlns:p="http://schemas.openxmlformats.org/presentationml/2006/main">
+  <p:cSld>
+    <p:spTree>
+      <p:nvGrpSpPr>
+        <p:cNvPr id="1" name=""/>
+        <p:cNvGrpSpPr/>
+        <p:nvPr/>
+      </p:nvGrpSpPr>
+      <p:grpSpPr>
+        <a:xfrm>
+          <a:off x="0" y="0"/>
+          <a:ext cx="0" cy="0"/>
+          <a:chOff x="0" y="0"/>
+          <a:chExt cx="0" cy="0"/>
+        </a:xfrm>
+      </p:grpSpPr>
+      <p:sp>
+        <p:nvSpPr>
+          <p:cNvPr id="29" name="Oval 28">
+            <a:extLst>
+              <a:ext uri="{FF2B5EF4-FFF2-40B4-BE49-F238E27FC236}">
+                <a16:creationId xmlns:a16="http://schemas.microsoft.com/office/drawing/2014/main" id="{AFA79617-060D-2742-8B19-2A1866E51AAB}"/>
+              </a:ext>
+            </a:extLst>
+          </p:cNvPr>
+          <p:cNvSpPr/>
+          <p:nvPr/>
+        </p:nvSpPr>
+        <p:spPr>
+          <a:xfrm>
+            <a:off x="4465285" y="445204"/>
+            <a:ext cx="478465" cy="478465"/>
+          </a:xfrm>
+          <a:prstGeom prst="ellipse">
+            <a:avLst/>
+          </a:prstGeom>
+          <a:noFill/>
+          <a:ln>
+            <a:solidFill>
+              <a:schemeClr val="tx1"/>
+            </a:solidFill>
+          </a:ln>
+        </p:spPr>
+        <p:style>
+          <a:lnRef idx="2">
+            <a:schemeClr val="accent1">
+              <a:shade val="50000"/>
+            </a:schemeClr>
+          </a:lnRef>
+          <a:fillRef idx="1">
+            <a:schemeClr val="accent1"/>
+          </a:fillRef>
+          <a:effectRef idx="0">
+            <a:schemeClr val="accent1"/>
+          </a:effectRef>
+          <a:fontRef idx="minor">
+            <a:schemeClr val="lt1"/>
+          </a:fontRef>
+        </p:style>
+        <p:txBody>
+          <a:bodyPr rtlCol="0" anchor="ctr"/>
+          <a:lstStyle/>
+          <a:p>
+            <a:pPr algn="ctr"/>
+            <a:endParaRPr lang="en-US"/>
+          </a:p>
+        </p:txBody>
+      </p:sp>
+      <p:sp>
+        <p:nvSpPr>
+          <p:cNvPr id="30" name="Oval 29">
+            <a:extLst>
+              <a:ext uri="{FF2B5EF4-FFF2-40B4-BE49-F238E27FC236}">
+                <a16:creationId xmlns:a16="http://schemas.microsoft.com/office/drawing/2014/main" id="{D428A571-F715-1D40-AC70-A512F6F319DF}"/>
+              </a:ext>
+            </a:extLst>
+          </p:cNvPr>
+          <p:cNvSpPr/>
+          <p:nvPr/>
+        </p:nvSpPr>
+        <p:spPr>
+          <a:xfrm>
+            <a:off x="4465285" y="1320618"/>
+            <a:ext cx="478465" cy="478465"/>
+          </a:xfrm>
+          <a:prstGeom prst="ellipse">
+            <a:avLst/>
+          </a:prstGeom>
+          <a:noFill/>
+          <a:ln>
+            <a:solidFill>
+              <a:schemeClr val="tx1"/>
+            </a:solidFill>
+          </a:ln>
+        </p:spPr>
+        <p:style>
+          <a:lnRef idx="2">
+            <a:schemeClr val="accent1">
+              <a:shade val="50000"/>
+            </a:schemeClr>
+          </a:lnRef>
+          <a:fillRef idx="1">
+            <a:schemeClr val="accent1"/>
+          </a:fillRef>
+          <a:effectRef idx="0">
+            <a:schemeClr val="accent1"/>
+          </a:effectRef>
+          <a:fontRef idx="minor">
+            <a:schemeClr val="lt1"/>
+          </a:fontRef>
+        </p:style>
+        <p:txBody>
+          <a:bodyPr rtlCol="0" anchor="ctr"/>
+          <a:lstStyle/>
+          <a:p>
+            <a:pPr algn="ctr"/>
+            <a:endParaRPr lang="en-US"/>
+          </a:p>
+        </p:txBody>
+      </p:sp>
+      <p:sp>
+        <p:nvSpPr>
+          <p:cNvPr id="31" name="Oval 30">
+            <a:extLst>
+              <a:ext uri="{FF2B5EF4-FFF2-40B4-BE49-F238E27FC236}">
+                <a16:creationId xmlns:a16="http://schemas.microsoft.com/office/drawing/2014/main" id="{AF5439CA-38C6-6449-8F2A-D96D213944BB}"/>
+              </a:ext>
+            </a:extLst>
+          </p:cNvPr>
+          <p:cNvSpPr/>
+          <p:nvPr/>
+        </p:nvSpPr>
+        <p:spPr>
+          <a:xfrm>
+            <a:off x="4465285" y="2222612"/>
+            <a:ext cx="478465" cy="478465"/>
+          </a:xfrm>
+          <a:prstGeom prst="ellipse">
+            <a:avLst/>
+          </a:prstGeom>
+          <a:noFill/>
+          <a:ln>
+            <a:solidFill>
+              <a:schemeClr val="tx1"/>
+            </a:solidFill>
+          </a:ln>
+        </p:spPr>
+        <p:style>
+          <a:lnRef idx="2">
+            <a:schemeClr val="accent1">
+              <a:shade val="50000"/>
+            </a:schemeClr>
+          </a:lnRef>
+          <a:fillRef idx="1">
+            <a:schemeClr val="accent1"/>
+          </a:fillRef>
+          <a:effectRef idx="0">
+            <a:schemeClr val="accent1"/>
+          </a:effectRef>
+          <a:fontRef idx="minor">
+            <a:schemeClr val="lt1"/>
+          </a:fontRef>
+        </p:style>
+        <p:txBody>
+          <a:bodyPr rtlCol="0" anchor="ctr"/>
+          <a:lstStyle/>
+          <a:p>
+            <a:pPr algn="ctr"/>
+            <a:endParaRPr lang="en-US"/>
+          </a:p>
+        </p:txBody>
+      </p:sp>
+      <p:sp>
+        <p:nvSpPr>
+          <p:cNvPr id="32" name="Oval 31">
+            <a:extLst>
+              <a:ext uri="{FF2B5EF4-FFF2-40B4-BE49-F238E27FC236}">
+                <a16:creationId xmlns:a16="http://schemas.microsoft.com/office/drawing/2014/main" id="{4AFE8735-6AE8-D649-9EFB-ABFD4F21569A}"/>
+              </a:ext>
+            </a:extLst>
+          </p:cNvPr>
+          <p:cNvSpPr/>
+          <p:nvPr/>
+        </p:nvSpPr>
+        <p:spPr>
+          <a:xfrm>
+            <a:off x="4465284" y="3967752"/>
+            <a:ext cx="478465" cy="478465"/>
+          </a:xfrm>
+          <a:prstGeom prst="ellipse">
+            <a:avLst/>
+          </a:prstGeom>
+          <a:noFill/>
+          <a:ln>
+            <a:solidFill>
+              <a:schemeClr val="tx1"/>
+            </a:solidFill>
+          </a:ln>
+        </p:spPr>
+        <p:style>
+          <a:lnRef idx="2">
+            <a:schemeClr val="accent1">
+              <a:shade val="50000"/>
+            </a:schemeClr>
+          </a:lnRef>
+          <a:fillRef idx="1">
+            <a:schemeClr val="accent1"/>
+          </a:fillRef>
+          <a:effectRef idx="0">
+            <a:schemeClr val="accent1"/>
+          </a:effectRef>
+          <a:fontRef idx="minor">
+            <a:schemeClr val="lt1"/>
+          </a:fontRef>
+        </p:style>
+        <p:txBody>
+          <a:bodyPr rtlCol="0" anchor="ctr"/>
+          <a:lstStyle/>
+          <a:p>
+            <a:pPr algn="ctr"/>
+            <a:endParaRPr lang="en-US"/>
+          </a:p>
+        </p:txBody>
+      </p:sp>
+      <p:sp>
+        <p:nvSpPr>
+          <p:cNvPr id="33" name="TextBox 32">
+            <a:extLst>
+              <a:ext uri="{FF2B5EF4-FFF2-40B4-BE49-F238E27FC236}">
+                <a16:creationId xmlns:a16="http://schemas.microsoft.com/office/drawing/2014/main" id="{3606461D-8417-C64F-BA1E-7C3C5459BC5A}"/>
+              </a:ext>
+            </a:extLst>
+          </p:cNvPr>
+          <p:cNvSpPr txBox="1"/>
+          <p:nvPr/>
+        </p:nvSpPr>
+        <p:spPr>
+          <a:xfrm>
+            <a:off x="5281671" y="455558"/>
+            <a:ext cx="2249334" cy="369332"/>
+          </a:xfrm>
+          <a:prstGeom prst="rect">
+            <a:avLst/>
+          </a:prstGeom>
+          <a:noFill/>
+        </p:spPr>
+        <p:txBody>
+          <a:bodyPr wrap="none" rtlCol="0">
+            <a:spAutoFit/>
+          </a:bodyPr>
+          <a:lstStyle/>
+          <a:p>
+            <a:r>
+              <a:rPr lang="en-US" dirty="0">
+                <a:latin typeface="Arial" panose="020B0604020202020204" pitchFamily="34" charset="0"/>
+                <a:cs typeface="Arial" panose="020B0604020202020204" pitchFamily="34" charset="0"/>
+              </a:rPr>
+              <a:t>Create words vector</a:t>
+            </a:r>
+          </a:p>
+        </p:txBody>
+      </p:sp>
+      <p:sp>
+        <p:nvSpPr>
+          <p:cNvPr id="34" name="TextBox 33">
+            <a:extLst>
+              <a:ext uri="{FF2B5EF4-FFF2-40B4-BE49-F238E27FC236}">
+                <a16:creationId xmlns:a16="http://schemas.microsoft.com/office/drawing/2014/main" id="{D89EEE05-A476-3F45-8768-4AD38524E83B}"/>
+              </a:ext>
+            </a:extLst>
+          </p:cNvPr>
+          <p:cNvSpPr txBox="1"/>
+          <p:nvPr/>
+        </p:nvSpPr>
+        <p:spPr>
+          <a:xfrm>
+            <a:off x="5789978" y="1177469"/>
+            <a:ext cx="1685077" cy="369332"/>
+          </a:xfrm>
+          <a:prstGeom prst="rect">
+            <a:avLst/>
+          </a:prstGeom>
+          <a:noFill/>
+        </p:spPr>
+        <p:txBody>
+          <a:bodyPr wrap="none" rtlCol="0">
+            <a:spAutoFit/>
+          </a:bodyPr>
+          <a:lstStyle/>
+          <a:p>
+            <a:r>
+              <a:rPr lang="en-US" dirty="0">
+                <a:latin typeface="Arial" panose="020B0604020202020204" pitchFamily="34" charset="0"/>
+                <a:cs typeface="Arial" panose="020B0604020202020204" pitchFamily="34" charset="0"/>
+              </a:rPr>
+              <a:t>Oh hey a loop!</a:t>
+            </a:r>
+          </a:p>
+        </p:txBody>
+      </p:sp>
+      <p:sp>
+        <p:nvSpPr>
+          <p:cNvPr id="35" name="TextBox 34">
+            <a:extLst>
+              <a:ext uri="{FF2B5EF4-FFF2-40B4-BE49-F238E27FC236}">
+                <a16:creationId xmlns:a16="http://schemas.microsoft.com/office/drawing/2014/main" id="{788AB037-F62B-F645-8C4E-48F1D10CF2F0}"/>
+              </a:ext>
+            </a:extLst>
+          </p:cNvPr>
+          <p:cNvSpPr txBox="1"/>
+          <p:nvPr/>
+        </p:nvSpPr>
+        <p:spPr>
+          <a:xfrm>
+            <a:off x="5779648" y="2283038"/>
+            <a:ext cx="3172663" cy="369332"/>
+          </a:xfrm>
+          <a:prstGeom prst="rect">
+            <a:avLst/>
+          </a:prstGeom>
+          <a:noFill/>
+        </p:spPr>
+        <p:txBody>
+          <a:bodyPr wrap="none" rtlCol="0">
+            <a:spAutoFit/>
+          </a:bodyPr>
+          <a:lstStyle/>
+          <a:p>
+            <a:r>
+              <a:rPr lang="en-US" dirty="0">
+                <a:latin typeface="Arial" panose="020B0604020202020204" pitchFamily="34" charset="0"/>
+                <a:cs typeface="Arial" panose="020B0604020202020204" pitchFamily="34" charset="0"/>
+              </a:rPr>
+              <a:t>Count the letters in </a:t>
+            </a:r>
+            <a:r>
+              <a:rPr lang="en-US" dirty="0" err="1">
+                <a:latin typeface="Arial" panose="020B0604020202020204" pitchFamily="34" charset="0"/>
+                <a:cs typeface="Arial" panose="020B0604020202020204" pitchFamily="34" charset="0"/>
+              </a:rPr>
+              <a:t>this_word</a:t>
+            </a:r>
+            <a:endParaRPr lang="en-US" dirty="0">
+              <a:latin typeface="Arial" panose="020B0604020202020204" pitchFamily="34" charset="0"/>
+              <a:cs typeface="Arial" panose="020B0604020202020204" pitchFamily="34" charset="0"/>
+            </a:endParaRPr>
+          </a:p>
+        </p:txBody>
+      </p:sp>
+      <p:sp>
+        <p:nvSpPr>
+          <p:cNvPr id="36" name="TextBox 35">
+            <a:extLst>
+              <a:ext uri="{FF2B5EF4-FFF2-40B4-BE49-F238E27FC236}">
+                <a16:creationId xmlns:a16="http://schemas.microsoft.com/office/drawing/2014/main" id="{91525458-0C1C-DD40-8CE6-A64C4796C8BA}"/>
+              </a:ext>
+            </a:extLst>
+          </p:cNvPr>
+          <p:cNvSpPr txBox="1"/>
+          <p:nvPr/>
+        </p:nvSpPr>
+        <p:spPr>
+          <a:xfrm>
+            <a:off x="5281671" y="5706470"/>
+            <a:ext cx="659155" cy="369332"/>
+          </a:xfrm>
+          <a:prstGeom prst="rect">
+            <a:avLst/>
+          </a:prstGeom>
+          <a:noFill/>
+        </p:spPr>
+        <p:txBody>
+          <a:bodyPr wrap="none" rtlCol="0">
+            <a:spAutoFit/>
+          </a:bodyPr>
+          <a:lstStyle/>
+          <a:p>
+            <a:r>
+              <a:rPr lang="en-US" dirty="0">
+                <a:latin typeface="Arial" panose="020B0604020202020204" pitchFamily="34" charset="0"/>
+                <a:cs typeface="Arial" panose="020B0604020202020204" pitchFamily="34" charset="0"/>
+              </a:rPr>
+              <a:t>Stop</a:t>
+            </a:r>
+          </a:p>
+        </p:txBody>
+      </p:sp>
+      <p:cxnSp>
+        <p:nvCxnSpPr>
+          <p:cNvPr id="37" name="Straight Arrow Connector 36">
+            <a:extLst>
+              <a:ext uri="{FF2B5EF4-FFF2-40B4-BE49-F238E27FC236}">
+                <a16:creationId xmlns:a16="http://schemas.microsoft.com/office/drawing/2014/main" id="{8FEA6428-3EF9-EB47-ADA8-EA6BA84F8931}"/>
+              </a:ext>
+            </a:extLst>
+          </p:cNvPr>
+          <p:cNvCxnSpPr>
+            <a:stCxn id="29" idx="4"/>
+            <a:endCxn id="30" idx="0"/>
+          </p:cNvCxnSpPr>
+          <p:nvPr/>
+        </p:nvCxnSpPr>
+        <p:spPr>
+          <a:xfrm>
+            <a:off x="4704518" y="923669"/>
+            <a:ext cx="0" cy="396949"/>
+          </a:xfrm>
+          <a:prstGeom prst="straightConnector1">
+            <a:avLst/>
+          </a:prstGeom>
+          <a:ln>
+            <a:solidFill>
+              <a:schemeClr val="tx1"/>
+            </a:solidFill>
+            <a:tailEnd type="triangle"/>
+          </a:ln>
+        </p:spPr>
+        <p:style>
+          <a:lnRef idx="1">
+            <a:schemeClr val="accent1"/>
+          </a:lnRef>
+          <a:fillRef idx="0">
+            <a:schemeClr val="accent1"/>
+          </a:fillRef>
+          <a:effectRef idx="0">
+            <a:schemeClr val="accent1"/>
+          </a:effectRef>
+          <a:fontRef idx="minor">
+            <a:schemeClr val="tx1"/>
+          </a:fontRef>
+        </p:style>
+      </p:cxnSp>
+      <p:cxnSp>
+        <p:nvCxnSpPr>
+          <p:cNvPr id="38" name="Straight Arrow Connector 37">
+            <a:extLst>
+              <a:ext uri="{FF2B5EF4-FFF2-40B4-BE49-F238E27FC236}">
+                <a16:creationId xmlns:a16="http://schemas.microsoft.com/office/drawing/2014/main" id="{A252B8A9-8FD3-204E-BDF1-303210146732}"/>
+              </a:ext>
+            </a:extLst>
+          </p:cNvPr>
+          <p:cNvCxnSpPr>
+            <a:cxnSpLocks/>
+            <a:stCxn id="30" idx="4"/>
+            <a:endCxn id="31" idx="0"/>
+          </p:cNvCxnSpPr>
+          <p:nvPr/>
+        </p:nvCxnSpPr>
+        <p:spPr>
+          <a:xfrm>
+            <a:off x="4704518" y="1799083"/>
+            <a:ext cx="0" cy="423529"/>
+          </a:xfrm>
+          <a:prstGeom prst="straightConnector1">
+            <a:avLst/>
+          </a:prstGeom>
+          <a:ln>
+            <a:solidFill>
+              <a:schemeClr val="tx1"/>
+            </a:solidFill>
+            <a:tailEnd type="triangle"/>
+          </a:ln>
+        </p:spPr>
+        <p:style>
+          <a:lnRef idx="1">
+            <a:schemeClr val="accent1"/>
+          </a:lnRef>
+          <a:fillRef idx="0">
+            <a:schemeClr val="accent1"/>
+          </a:fillRef>
+          <a:effectRef idx="0">
+            <a:schemeClr val="accent1"/>
+          </a:effectRef>
+          <a:fontRef idx="minor">
+            <a:schemeClr val="tx1"/>
+          </a:fontRef>
+        </p:style>
+      </p:cxnSp>
+      <p:sp>
+        <p:nvSpPr>
+          <p:cNvPr id="47" name="TextBox 46">
+            <a:extLst>
+              <a:ext uri="{FF2B5EF4-FFF2-40B4-BE49-F238E27FC236}">
+                <a16:creationId xmlns:a16="http://schemas.microsoft.com/office/drawing/2014/main" id="{E743EF94-0F53-694B-B726-AE18C9C1F1ED}"/>
+              </a:ext>
+            </a:extLst>
+          </p:cNvPr>
+          <p:cNvSpPr txBox="1"/>
+          <p:nvPr/>
+        </p:nvSpPr>
+        <p:spPr>
+          <a:xfrm>
+            <a:off x="2781046" y="2915412"/>
+            <a:ext cx="1326804" cy="923330"/>
+          </a:xfrm>
+          <a:prstGeom prst="rect">
+            <a:avLst/>
+          </a:prstGeom>
+          <a:noFill/>
+        </p:spPr>
+        <p:txBody>
+          <a:bodyPr wrap="square" rtlCol="0">
+            <a:spAutoFit/>
+          </a:bodyPr>
+          <a:lstStyle/>
+          <a:p>
+            <a:r>
+              <a:rPr lang="en-US" dirty="0">
+                <a:latin typeface="Arial" panose="020B0604020202020204" pitchFamily="34" charset="0"/>
+                <a:cs typeface="Arial" panose="020B0604020202020204" pitchFamily="34" charset="0"/>
+              </a:rPr>
+              <a:t>I can’t, that was the last one </a:t>
+            </a:r>
+          </a:p>
+        </p:txBody>
+      </p:sp>
+      <p:sp>
+        <p:nvSpPr>
+          <p:cNvPr id="48" name="TextBox 47">
+            <a:extLst>
+              <a:ext uri="{FF2B5EF4-FFF2-40B4-BE49-F238E27FC236}">
+                <a16:creationId xmlns:a16="http://schemas.microsoft.com/office/drawing/2014/main" id="{7AB70A2E-5BC3-E744-B8CB-4E3AEC296AD6}"/>
+              </a:ext>
+            </a:extLst>
+          </p:cNvPr>
+          <p:cNvSpPr txBox="1"/>
+          <p:nvPr/>
+        </p:nvSpPr>
+        <p:spPr>
+          <a:xfrm>
+            <a:off x="4307870" y="1826181"/>
+            <a:ext cx="428322" cy="369332"/>
+          </a:xfrm>
+          <a:prstGeom prst="rect">
+            <a:avLst/>
+          </a:prstGeom>
+          <a:noFill/>
+        </p:spPr>
+        <p:txBody>
+          <a:bodyPr wrap="none" rtlCol="0">
+            <a:spAutoFit/>
+          </a:bodyPr>
+          <a:lstStyle/>
+          <a:p>
+            <a:r>
+              <a:rPr lang="en-US" dirty="0">
+                <a:latin typeface="Arial" panose="020B0604020202020204" pitchFamily="34" charset="0"/>
+                <a:cs typeface="Arial" panose="020B0604020202020204" pitchFamily="34" charset="0"/>
+              </a:rPr>
+              <a:t>ok</a:t>
+            </a:r>
+          </a:p>
+        </p:txBody>
+      </p:sp>
+      <p:sp>
+        <p:nvSpPr>
+          <p:cNvPr id="41" name="TextBox 40">
+            <a:extLst>
+              <a:ext uri="{FF2B5EF4-FFF2-40B4-BE49-F238E27FC236}">
+                <a16:creationId xmlns:a16="http://schemas.microsoft.com/office/drawing/2014/main" id="{034F9B18-558C-094E-8690-C9B369C690B2}"/>
+              </a:ext>
+            </a:extLst>
+          </p:cNvPr>
+          <p:cNvSpPr txBox="1"/>
+          <p:nvPr/>
+        </p:nvSpPr>
+        <p:spPr>
+          <a:xfrm>
+            <a:off x="5779647" y="1489861"/>
+            <a:ext cx="3288080" cy="369332"/>
+          </a:xfrm>
+          <a:prstGeom prst="rect">
+            <a:avLst/>
+          </a:prstGeom>
+          <a:noFill/>
+        </p:spPr>
+        <p:txBody>
+          <a:bodyPr wrap="none" rtlCol="0">
+            <a:spAutoFit/>
+          </a:bodyPr>
+          <a:lstStyle/>
+          <a:p>
+            <a:r>
+              <a:rPr lang="en-US" dirty="0">
+                <a:latin typeface="Arial" panose="020B0604020202020204" pitchFamily="34" charset="0"/>
+                <a:cs typeface="Arial" panose="020B0604020202020204" pitchFamily="34" charset="0"/>
+              </a:rPr>
+              <a:t>Set </a:t>
+            </a:r>
+            <a:r>
+              <a:rPr lang="en-US" dirty="0" err="1">
+                <a:latin typeface="Arial" panose="020B0604020202020204" pitchFamily="34" charset="0"/>
+                <a:cs typeface="Arial" panose="020B0604020202020204" pitchFamily="34" charset="0"/>
+              </a:rPr>
+              <a:t>this_word</a:t>
+            </a:r>
+            <a:r>
+              <a:rPr lang="en-US" dirty="0">
+                <a:latin typeface="Arial" panose="020B0604020202020204" pitchFamily="34" charset="0"/>
+                <a:cs typeface="Arial" panose="020B0604020202020204" pitchFamily="34" charset="0"/>
+              </a:rPr>
+              <a:t> to the next word</a:t>
+            </a:r>
+          </a:p>
+        </p:txBody>
+      </p:sp>
+      <p:sp>
+        <p:nvSpPr>
+          <p:cNvPr id="43" name="Oval 42">
+            <a:extLst>
+              <a:ext uri="{FF2B5EF4-FFF2-40B4-BE49-F238E27FC236}">
+                <a16:creationId xmlns:a16="http://schemas.microsoft.com/office/drawing/2014/main" id="{1BB9C37A-140F-4E43-A16A-51D66E5E6080}"/>
+              </a:ext>
+            </a:extLst>
+          </p:cNvPr>
+          <p:cNvSpPr/>
+          <p:nvPr/>
+        </p:nvSpPr>
+        <p:spPr>
+          <a:xfrm>
+            <a:off x="4465284" y="3124606"/>
+            <a:ext cx="478465" cy="478465"/>
+          </a:xfrm>
+          <a:prstGeom prst="ellipse">
+            <a:avLst/>
+          </a:prstGeom>
+          <a:noFill/>
+          <a:ln>
+            <a:solidFill>
+              <a:schemeClr val="tx1"/>
+            </a:solidFill>
+          </a:ln>
+        </p:spPr>
+        <p:style>
+          <a:lnRef idx="2">
+            <a:schemeClr val="accent1">
+              <a:shade val="50000"/>
+            </a:schemeClr>
+          </a:lnRef>
+          <a:fillRef idx="1">
+            <a:schemeClr val="accent1"/>
+          </a:fillRef>
+          <a:effectRef idx="0">
+            <a:schemeClr val="accent1"/>
+          </a:effectRef>
+          <a:fontRef idx="minor">
+            <a:schemeClr val="lt1"/>
+          </a:fontRef>
+        </p:style>
+        <p:txBody>
+          <a:bodyPr rtlCol="0" anchor="ctr"/>
+          <a:lstStyle/>
+          <a:p>
+            <a:pPr algn="ctr"/>
+            <a:endParaRPr lang="en-US"/>
+          </a:p>
+        </p:txBody>
+      </p:sp>
+      <p:cxnSp>
+        <p:nvCxnSpPr>
+          <p:cNvPr id="44" name="Straight Arrow Connector 43">
+            <a:extLst>
+              <a:ext uri="{FF2B5EF4-FFF2-40B4-BE49-F238E27FC236}">
+                <a16:creationId xmlns:a16="http://schemas.microsoft.com/office/drawing/2014/main" id="{5A3345E1-ACA2-664D-AFAE-E10DC6B7660F}"/>
+              </a:ext>
+            </a:extLst>
+          </p:cNvPr>
+          <p:cNvCxnSpPr>
+            <a:cxnSpLocks/>
+            <a:endCxn id="43" idx="0"/>
+          </p:cNvCxnSpPr>
+          <p:nvPr/>
+        </p:nvCxnSpPr>
+        <p:spPr>
+          <a:xfrm>
+            <a:off x="4704517" y="2701077"/>
+            <a:ext cx="0" cy="423529"/>
+          </a:xfrm>
+          <a:prstGeom prst="straightConnector1">
+            <a:avLst/>
+          </a:prstGeom>
+          <a:ln>
+            <a:solidFill>
+              <a:schemeClr val="tx1"/>
+            </a:solidFill>
+            <a:tailEnd type="triangle"/>
+          </a:ln>
+        </p:spPr>
+        <p:style>
+          <a:lnRef idx="1">
+            <a:schemeClr val="accent1"/>
+          </a:lnRef>
+          <a:fillRef idx="0">
+            <a:schemeClr val="accent1"/>
+          </a:fillRef>
+          <a:effectRef idx="0">
+            <a:schemeClr val="accent1"/>
+          </a:effectRef>
+          <a:fontRef idx="minor">
+            <a:schemeClr val="tx1"/>
+          </a:fontRef>
+        </p:style>
+      </p:cxnSp>
+      <p:sp>
+        <p:nvSpPr>
+          <p:cNvPr id="54" name="TextBox 53">
+            <a:extLst>
+              <a:ext uri="{FF2B5EF4-FFF2-40B4-BE49-F238E27FC236}">
+                <a16:creationId xmlns:a16="http://schemas.microsoft.com/office/drawing/2014/main" id="{50958B0F-7827-A54C-B8DA-36B4F163C561}"/>
+              </a:ext>
+            </a:extLst>
+          </p:cNvPr>
+          <p:cNvSpPr txBox="1"/>
+          <p:nvPr/>
+        </p:nvSpPr>
+        <p:spPr>
+          <a:xfrm>
+            <a:off x="5779648" y="3180242"/>
+            <a:ext cx="2864819" cy="369332"/>
+          </a:xfrm>
+          <a:prstGeom prst="rect">
+            <a:avLst/>
+          </a:prstGeom>
+          <a:noFill/>
+        </p:spPr>
+        <p:txBody>
+          <a:bodyPr wrap="square" rtlCol="0">
+            <a:spAutoFit/>
+          </a:bodyPr>
+          <a:lstStyle/>
+          <a:p>
+            <a:r>
+              <a:rPr lang="en-US" dirty="0">
+                <a:latin typeface="Arial" panose="020B0604020202020204" pitchFamily="34" charset="0"/>
+                <a:cs typeface="Arial" panose="020B0604020202020204" pitchFamily="34" charset="0"/>
+              </a:rPr>
+              <a:t>Make an upper case word</a:t>
+            </a:r>
+          </a:p>
+        </p:txBody>
+      </p:sp>
+      <p:cxnSp>
+        <p:nvCxnSpPr>
+          <p:cNvPr id="72" name="Elbow Connector 71">
+            <a:extLst>
+              <a:ext uri="{FF2B5EF4-FFF2-40B4-BE49-F238E27FC236}">
+                <a16:creationId xmlns:a16="http://schemas.microsoft.com/office/drawing/2014/main" id="{96068463-4DA2-6B4C-9510-1E7F843644B6}"/>
+              </a:ext>
+            </a:extLst>
+          </p:cNvPr>
+          <p:cNvCxnSpPr>
+            <a:cxnSpLocks/>
+            <a:stCxn id="30" idx="2"/>
+            <a:endCxn id="24" idx="2"/>
+          </p:cNvCxnSpPr>
+          <p:nvPr/>
+        </p:nvCxnSpPr>
+        <p:spPr>
+          <a:xfrm rot="10800000" flipV="1">
+            <a:off x="4465283" y="1559851"/>
+            <a:ext cx="3" cy="4331286"/>
+          </a:xfrm>
+          <a:prstGeom prst="bentConnector3">
+            <a:avLst>
+              <a:gd name="adj1" fmla="val 7620100000"/>
+            </a:avLst>
+          </a:prstGeom>
+          <a:ln>
+            <a:tailEnd type="triangle"/>
+          </a:ln>
+        </p:spPr>
+        <p:style>
+          <a:lnRef idx="1">
+            <a:schemeClr val="dk1"/>
+          </a:lnRef>
+          <a:fillRef idx="0">
+            <a:schemeClr val="dk1"/>
+          </a:fillRef>
+          <a:effectRef idx="0">
+            <a:schemeClr val="dk1"/>
+          </a:effectRef>
+          <a:fontRef idx="minor">
+            <a:schemeClr val="tx1"/>
+          </a:fontRef>
+        </p:style>
+      </p:cxnSp>
+      <p:cxnSp>
+        <p:nvCxnSpPr>
+          <p:cNvPr id="75" name="Elbow Connector 74">
+            <a:extLst>
+              <a:ext uri="{FF2B5EF4-FFF2-40B4-BE49-F238E27FC236}">
+                <a16:creationId xmlns:a16="http://schemas.microsoft.com/office/drawing/2014/main" id="{4C4F7FBE-D53F-AB40-88DA-ACC0743CD17F}"/>
+              </a:ext>
+            </a:extLst>
+          </p:cNvPr>
+          <p:cNvCxnSpPr>
+            <a:cxnSpLocks/>
+            <a:stCxn id="23" idx="6"/>
+            <a:endCxn id="30" idx="6"/>
+          </p:cNvCxnSpPr>
+          <p:nvPr/>
+        </p:nvCxnSpPr>
+        <p:spPr>
+          <a:xfrm flipV="1">
+            <a:off x="4943748" y="1559851"/>
+            <a:ext cx="2" cy="3490280"/>
+          </a:xfrm>
+          <a:prstGeom prst="bentConnector3">
+            <a:avLst>
+              <a:gd name="adj1" fmla="val 11430100000"/>
+            </a:avLst>
+          </a:prstGeom>
+          <a:ln>
+            <a:solidFill>
+              <a:schemeClr val="tx1"/>
+            </a:solidFill>
+            <a:tailEnd type="triangle"/>
+          </a:ln>
+        </p:spPr>
+        <p:style>
+          <a:lnRef idx="1">
+            <a:schemeClr val="accent1"/>
+          </a:lnRef>
+          <a:fillRef idx="0">
+            <a:schemeClr val="accent1"/>
+          </a:fillRef>
+          <a:effectRef idx="0">
+            <a:schemeClr val="accent1"/>
+          </a:effectRef>
+          <a:fontRef idx="minor">
+            <a:schemeClr val="tx1"/>
+          </a:fontRef>
+        </p:style>
+      </p:cxnSp>
+      <p:sp>
+        <p:nvSpPr>
+          <p:cNvPr id="21" name="TextBox 20">
+            <a:extLst>
+              <a:ext uri="{FF2B5EF4-FFF2-40B4-BE49-F238E27FC236}">
+                <a16:creationId xmlns:a16="http://schemas.microsoft.com/office/drawing/2014/main" id="{DCDE8FEB-A1AD-0343-9BD9-A6BAA242C9D6}"/>
+              </a:ext>
+            </a:extLst>
+          </p:cNvPr>
+          <p:cNvSpPr txBox="1"/>
+          <p:nvPr/>
+        </p:nvSpPr>
+        <p:spPr>
+          <a:xfrm>
+            <a:off x="5779647" y="4022318"/>
+            <a:ext cx="3461867" cy="369332"/>
+          </a:xfrm>
+          <a:prstGeom prst="rect">
+            <a:avLst/>
+          </a:prstGeom>
+          <a:noFill/>
+        </p:spPr>
+        <p:txBody>
+          <a:bodyPr wrap="square" rtlCol="0">
+            <a:spAutoFit/>
+          </a:bodyPr>
+          <a:lstStyle/>
+          <a:p>
+            <a:r>
+              <a:rPr lang="en-US" dirty="0">
+                <a:latin typeface="Arial" panose="020B0604020202020204" pitchFamily="34" charset="0"/>
+                <a:cs typeface="Arial" panose="020B0604020202020204" pitchFamily="34" charset="0"/>
+              </a:rPr>
+              <a:t>Print a message to the console</a:t>
+            </a:r>
+          </a:p>
+        </p:txBody>
+      </p:sp>
+      <p:sp>
+        <p:nvSpPr>
+          <p:cNvPr id="22" name="TextBox 21">
+            <a:extLst>
+              <a:ext uri="{FF2B5EF4-FFF2-40B4-BE49-F238E27FC236}">
+                <a16:creationId xmlns:a16="http://schemas.microsoft.com/office/drawing/2014/main" id="{64A4F10E-177C-AA46-BD71-EDFC2EB201EB}"/>
+              </a:ext>
+            </a:extLst>
+          </p:cNvPr>
+          <p:cNvSpPr txBox="1"/>
+          <p:nvPr/>
+        </p:nvSpPr>
+        <p:spPr>
+          <a:xfrm>
+            <a:off x="5779648" y="4841410"/>
+            <a:ext cx="3461867" cy="369332"/>
+          </a:xfrm>
+          <a:prstGeom prst="rect">
+            <a:avLst/>
+          </a:prstGeom>
+          <a:noFill/>
+        </p:spPr>
+        <p:txBody>
+          <a:bodyPr wrap="square" rtlCol="0">
+            <a:spAutoFit/>
+          </a:bodyPr>
+          <a:lstStyle/>
+          <a:p>
+            <a:r>
+              <a:rPr lang="en-US" dirty="0">
+                <a:latin typeface="Arial" panose="020B0604020202020204" pitchFamily="34" charset="0"/>
+                <a:cs typeface="Arial" panose="020B0604020202020204" pitchFamily="34" charset="0"/>
+              </a:rPr>
+              <a:t>Go back to the top of the loop</a:t>
+            </a:r>
+          </a:p>
+        </p:txBody>
+      </p:sp>
+      <p:sp>
+        <p:nvSpPr>
+          <p:cNvPr id="23" name="Oval 22">
+            <a:extLst>
+              <a:ext uri="{FF2B5EF4-FFF2-40B4-BE49-F238E27FC236}">
+                <a16:creationId xmlns:a16="http://schemas.microsoft.com/office/drawing/2014/main" id="{F01E9CB5-3D8D-C94C-83F2-A5DA3D032A05}"/>
+              </a:ext>
+            </a:extLst>
+          </p:cNvPr>
+          <p:cNvSpPr/>
+          <p:nvPr/>
+        </p:nvSpPr>
+        <p:spPr>
+          <a:xfrm>
+            <a:off x="4465283" y="4810898"/>
+            <a:ext cx="478465" cy="478465"/>
+          </a:xfrm>
+          <a:prstGeom prst="ellipse">
+            <a:avLst/>
+          </a:prstGeom>
+          <a:noFill/>
+          <a:ln>
+            <a:solidFill>
+              <a:schemeClr val="tx1"/>
+            </a:solidFill>
+          </a:ln>
+        </p:spPr>
+        <p:style>
+          <a:lnRef idx="2">
+            <a:schemeClr val="accent1">
+              <a:shade val="50000"/>
+            </a:schemeClr>
+          </a:lnRef>
+          <a:fillRef idx="1">
+            <a:schemeClr val="accent1"/>
+          </a:fillRef>
+          <a:effectRef idx="0">
+            <a:schemeClr val="accent1"/>
+          </a:effectRef>
+          <a:fontRef idx="minor">
+            <a:schemeClr val="lt1"/>
+          </a:fontRef>
+        </p:style>
+        <p:txBody>
+          <a:bodyPr rtlCol="0" anchor="ctr"/>
+          <a:lstStyle/>
+          <a:p>
+            <a:pPr algn="ctr"/>
+            <a:endParaRPr lang="en-US"/>
+          </a:p>
+        </p:txBody>
+      </p:sp>
+      <p:sp>
+        <p:nvSpPr>
+          <p:cNvPr id="24" name="Oval 23">
+            <a:extLst>
+              <a:ext uri="{FF2B5EF4-FFF2-40B4-BE49-F238E27FC236}">
+                <a16:creationId xmlns:a16="http://schemas.microsoft.com/office/drawing/2014/main" id="{BE22CC75-1AC8-974E-9367-AFCFF2B0BB39}"/>
+              </a:ext>
+            </a:extLst>
+          </p:cNvPr>
+          <p:cNvSpPr/>
+          <p:nvPr/>
+        </p:nvSpPr>
+        <p:spPr>
+          <a:xfrm>
+            <a:off x="4465282" y="5651904"/>
+            <a:ext cx="478465" cy="478465"/>
+          </a:xfrm>
+          <a:prstGeom prst="ellipse">
+            <a:avLst/>
+          </a:prstGeom>
+          <a:noFill/>
+          <a:ln>
+            <a:solidFill>
+              <a:schemeClr val="tx1"/>
+            </a:solidFill>
+          </a:ln>
+        </p:spPr>
+        <p:style>
+          <a:lnRef idx="2">
+            <a:schemeClr val="accent1">
+              <a:shade val="50000"/>
+            </a:schemeClr>
+          </a:lnRef>
+          <a:fillRef idx="1">
+            <a:schemeClr val="accent1"/>
+          </a:fillRef>
+          <a:effectRef idx="0">
+            <a:schemeClr val="accent1"/>
+          </a:effectRef>
+          <a:fontRef idx="minor">
+            <a:schemeClr val="lt1"/>
+          </a:fontRef>
+        </p:style>
+        <p:txBody>
+          <a:bodyPr rtlCol="0" anchor="ctr"/>
+          <a:lstStyle/>
+          <a:p>
+            <a:pPr algn="ctr"/>
+            <a:endParaRPr lang="en-US"/>
+          </a:p>
+        </p:txBody>
+      </p:sp>
+      <p:cxnSp>
+        <p:nvCxnSpPr>
+          <p:cNvPr id="25" name="Straight Arrow Connector 24">
+            <a:extLst>
+              <a:ext uri="{FF2B5EF4-FFF2-40B4-BE49-F238E27FC236}">
+                <a16:creationId xmlns:a16="http://schemas.microsoft.com/office/drawing/2014/main" id="{72844ED7-8AAB-7645-9456-7C8E1B89CA9D}"/>
+              </a:ext>
+            </a:extLst>
+          </p:cNvPr>
+          <p:cNvCxnSpPr>
+            <a:cxnSpLocks/>
+            <a:stCxn id="43" idx="4"/>
+            <a:endCxn id="32" idx="0"/>
+          </p:cNvCxnSpPr>
+          <p:nvPr/>
+        </p:nvCxnSpPr>
+        <p:spPr>
+          <a:xfrm>
+            <a:off x="4704517" y="3603071"/>
+            <a:ext cx="0" cy="364681"/>
+          </a:xfrm>
+          <a:prstGeom prst="straightConnector1">
+            <a:avLst/>
+          </a:prstGeom>
+          <a:ln>
+            <a:solidFill>
+              <a:schemeClr val="tx1"/>
+            </a:solidFill>
+            <a:tailEnd type="triangle"/>
+          </a:ln>
+        </p:spPr>
+        <p:style>
+          <a:lnRef idx="1">
+            <a:schemeClr val="accent1"/>
+          </a:lnRef>
+          <a:fillRef idx="0">
+            <a:schemeClr val="accent1"/>
+          </a:fillRef>
+          <a:effectRef idx="0">
+            <a:schemeClr val="accent1"/>
+          </a:effectRef>
+          <a:fontRef idx="minor">
+            <a:schemeClr val="tx1"/>
+          </a:fontRef>
+        </p:style>
+      </p:cxnSp>
+      <p:cxnSp>
+        <p:nvCxnSpPr>
+          <p:cNvPr id="28" name="Straight Arrow Connector 27">
+            <a:extLst>
+              <a:ext uri="{FF2B5EF4-FFF2-40B4-BE49-F238E27FC236}">
+                <a16:creationId xmlns:a16="http://schemas.microsoft.com/office/drawing/2014/main" id="{6DFCF0FD-0BD5-814B-9CA2-3AF185F3E6D4}"/>
+              </a:ext>
+            </a:extLst>
+          </p:cNvPr>
+          <p:cNvCxnSpPr>
+            <a:cxnSpLocks/>
+            <a:stCxn id="32" idx="4"/>
+            <a:endCxn id="23" idx="0"/>
+          </p:cNvCxnSpPr>
+          <p:nvPr/>
+        </p:nvCxnSpPr>
+        <p:spPr>
+          <a:xfrm flipH="1">
+            <a:off x="4704516" y="4446217"/>
+            <a:ext cx="1" cy="364681"/>
+          </a:xfrm>
+          <a:prstGeom prst="straightConnector1">
+            <a:avLst/>
+          </a:prstGeom>
+          <a:ln>
+            <a:solidFill>
+              <a:schemeClr val="tx1"/>
+            </a:solidFill>
+            <a:tailEnd type="triangle"/>
+          </a:ln>
+        </p:spPr>
+        <p:style>
+          <a:lnRef idx="1">
+            <a:schemeClr val="accent1"/>
+          </a:lnRef>
+          <a:fillRef idx="0">
+            <a:schemeClr val="accent1"/>
+          </a:fillRef>
+          <a:effectRef idx="0">
+            <a:schemeClr val="accent1"/>
+          </a:effectRef>
+          <a:fontRef idx="minor">
+            <a:schemeClr val="tx1"/>
+          </a:fontRef>
+        </p:style>
+      </p:cxnSp>
+    </p:spTree>
+    <p:extLst>
+      <p:ext uri="{BB962C8B-B14F-4D97-AF65-F5344CB8AC3E}">
+        <p14:creationId xmlns:p14="http://schemas.microsoft.com/office/powerpoint/2010/main" val="3403598371"/>
+      </p:ext>
+    </p:extLst>
+  </p:cSld>
+  <p:clrMapOvr>
+    <a:masterClrMapping/>
+  </p:clrMapOvr>
+</p:sld>
+</file>
+
 <file path=ppt/theme/theme1.xml><?xml version="1.0" encoding="utf-8"?>
 <a:theme xmlns:a="http://schemas.openxmlformats.org/drawingml/2006/main" name="Office Theme">
   <a:themeElements>

</xml_diff>